<commit_message>
atualização no Slide UX Design 04 (adição das setas)
</commit_message>
<xml_diff>
--- a/ux/Slide UX Design 04.pptx
+++ b/ux/Slide UX Design 04.pptx
@@ -319,13 +319,13 @@
   <p:clrMapOvr>
     <a:masterClrMapping/>
   </p:clrMapOvr>
-  <mc:AlternateContent xmlns:mc="http://schemas.openxmlformats.org/markup-compatibility/2006">
-    <mc:Choice xmlns:p14="http://schemas.microsoft.com/office/powerpoint/2010/main" Requires="p14">
+  <mc:AlternateContent xmlns:mc="http://schemas.openxmlformats.org/markup-compatibility/2006" xmlns:p14="http://schemas.microsoft.com/office/powerpoint/2010/main">
+    <mc:Choice Requires="p14">
       <p:transition spd="med">
         <p14:reveal/>
       </p:transition>
     </mc:Choice>
-    <mc:Fallback>
+    <mc:Fallback xmlns="">
       <p:transition spd="med">
         <p:fade/>
       </p:transition>
@@ -566,13 +566,13 @@
   <p:clrMapOvr>
     <a:masterClrMapping/>
   </p:clrMapOvr>
-  <mc:AlternateContent xmlns:mc="http://schemas.openxmlformats.org/markup-compatibility/2006">
-    <mc:Choice xmlns:p14="http://schemas.microsoft.com/office/powerpoint/2010/main" Requires="p14">
+  <mc:AlternateContent xmlns:mc="http://schemas.openxmlformats.org/markup-compatibility/2006" xmlns:p14="http://schemas.microsoft.com/office/powerpoint/2010/main">
+    <mc:Choice Requires="p14">
       <p:transition spd="med">
         <p14:reveal/>
       </p:transition>
     </mc:Choice>
-    <mc:Fallback>
+    <mc:Fallback xmlns="">
       <p:transition spd="med">
         <p:fade/>
       </p:transition>
@@ -822,13 +822,13 @@
   <p:clrMapOvr>
     <a:masterClrMapping/>
   </p:clrMapOvr>
-  <mc:AlternateContent xmlns:mc="http://schemas.openxmlformats.org/markup-compatibility/2006">
-    <mc:Choice xmlns:p14="http://schemas.microsoft.com/office/powerpoint/2010/main" Requires="p14">
+  <mc:AlternateContent xmlns:mc="http://schemas.openxmlformats.org/markup-compatibility/2006" xmlns:p14="http://schemas.microsoft.com/office/powerpoint/2010/main">
+    <mc:Choice Requires="p14">
       <p:transition spd="med">
         <p14:reveal/>
       </p:transition>
     </mc:Choice>
-    <mc:Fallback>
+    <mc:Fallback xmlns="">
       <p:transition spd="med">
         <p:fade/>
       </p:transition>
@@ -1068,13 +1068,13 @@
   <p:clrMapOvr>
     <a:masterClrMapping/>
   </p:clrMapOvr>
-  <mc:AlternateContent xmlns:mc="http://schemas.openxmlformats.org/markup-compatibility/2006">
-    <mc:Choice xmlns:p14="http://schemas.microsoft.com/office/powerpoint/2010/main" Requires="p14">
+  <mc:AlternateContent xmlns:mc="http://schemas.openxmlformats.org/markup-compatibility/2006" xmlns:p14="http://schemas.microsoft.com/office/powerpoint/2010/main">
+    <mc:Choice Requires="p14">
       <p:transition spd="med">
         <p14:reveal/>
       </p:transition>
     </mc:Choice>
-    <mc:Fallback>
+    <mc:Fallback xmlns="">
       <p:transition spd="med">
         <p:fade/>
       </p:transition>
@@ -1290,13 +1290,13 @@
   <p:clrMapOvr>
     <a:masterClrMapping/>
   </p:clrMapOvr>
-  <mc:AlternateContent xmlns:mc="http://schemas.openxmlformats.org/markup-compatibility/2006">
-    <mc:Choice xmlns:p14="http://schemas.microsoft.com/office/powerpoint/2010/main" Requires="p14">
+  <mc:AlternateContent xmlns:mc="http://schemas.openxmlformats.org/markup-compatibility/2006" xmlns:p14="http://schemas.microsoft.com/office/powerpoint/2010/main">
+    <mc:Choice Requires="p14">
       <p:transition spd="med">
         <p14:reveal/>
       </p:transition>
     </mc:Choice>
-    <mc:Fallback>
+    <mc:Fallback xmlns="">
       <p:transition spd="med">
         <p:fade/>
       </p:transition>
@@ -1619,13 +1619,13 @@
   <p:clrMapOvr>
     <a:masterClrMapping/>
   </p:clrMapOvr>
-  <mc:AlternateContent xmlns:mc="http://schemas.openxmlformats.org/markup-compatibility/2006">
-    <mc:Choice xmlns:p14="http://schemas.microsoft.com/office/powerpoint/2010/main" Requires="p14">
+  <mc:AlternateContent xmlns:mc="http://schemas.openxmlformats.org/markup-compatibility/2006" xmlns:p14="http://schemas.microsoft.com/office/powerpoint/2010/main">
+    <mc:Choice Requires="p14">
       <p:transition spd="med">
         <p14:reveal/>
       </p:transition>
     </mc:Choice>
-    <mc:Fallback>
+    <mc:Fallback xmlns="">
       <p:transition spd="med">
         <p:fade/>
       </p:transition>
@@ -2031,13 +2031,13 @@
   <p:clrMapOvr>
     <a:masterClrMapping/>
   </p:clrMapOvr>
-  <mc:AlternateContent xmlns:mc="http://schemas.openxmlformats.org/markup-compatibility/2006">
-    <mc:Choice xmlns:p14="http://schemas.microsoft.com/office/powerpoint/2010/main" Requires="p14">
+  <mc:AlternateContent xmlns:mc="http://schemas.openxmlformats.org/markup-compatibility/2006" xmlns:p14="http://schemas.microsoft.com/office/powerpoint/2010/main">
+    <mc:Choice Requires="p14">
       <p:transition spd="med">
         <p14:reveal/>
       </p:transition>
     </mc:Choice>
-    <mc:Fallback>
+    <mc:Fallback xmlns="">
       <p:transition spd="med">
         <p:fade/>
       </p:transition>
@@ -2204,13 +2204,13 @@
   <p:clrMapOvr>
     <a:masterClrMapping/>
   </p:clrMapOvr>
-  <mc:AlternateContent xmlns:mc="http://schemas.openxmlformats.org/markup-compatibility/2006">
-    <mc:Choice xmlns:p14="http://schemas.microsoft.com/office/powerpoint/2010/main" Requires="p14">
+  <mc:AlternateContent xmlns:mc="http://schemas.openxmlformats.org/markup-compatibility/2006" xmlns:p14="http://schemas.microsoft.com/office/powerpoint/2010/main">
+    <mc:Choice Requires="p14">
       <p:transition spd="med">
         <p14:reveal/>
       </p:transition>
     </mc:Choice>
-    <mc:Fallback>
+    <mc:Fallback xmlns="">
       <p:transition spd="med">
         <p:fade/>
       </p:transition>
@@ -2344,13 +2344,13 @@
   <p:clrMapOvr>
     <a:masterClrMapping/>
   </p:clrMapOvr>
-  <mc:AlternateContent xmlns:mc="http://schemas.openxmlformats.org/markup-compatibility/2006">
-    <mc:Choice xmlns:p14="http://schemas.microsoft.com/office/powerpoint/2010/main" Requires="p14">
+  <mc:AlternateContent xmlns:mc="http://schemas.openxmlformats.org/markup-compatibility/2006" xmlns:p14="http://schemas.microsoft.com/office/powerpoint/2010/main">
+    <mc:Choice Requires="p14">
       <p:transition spd="med">
         <p14:reveal/>
       </p:transition>
     </mc:Choice>
-    <mc:Fallback>
+    <mc:Fallback xmlns="">
       <p:transition spd="med">
         <p:fade/>
       </p:transition>
@@ -2640,13 +2640,13 @@
   <p:clrMapOvr>
     <a:masterClrMapping/>
   </p:clrMapOvr>
-  <mc:AlternateContent xmlns:mc="http://schemas.openxmlformats.org/markup-compatibility/2006">
-    <mc:Choice xmlns:p14="http://schemas.microsoft.com/office/powerpoint/2010/main" Requires="p14">
+  <mc:AlternateContent xmlns:mc="http://schemas.openxmlformats.org/markup-compatibility/2006" xmlns:p14="http://schemas.microsoft.com/office/powerpoint/2010/main">
+    <mc:Choice Requires="p14">
       <p:transition spd="med">
         <p14:reveal/>
       </p:transition>
     </mc:Choice>
-    <mc:Fallback>
+    <mc:Fallback xmlns="">
       <p:transition spd="med">
         <p:fade/>
       </p:transition>
@@ -2893,13 +2893,13 @@
   <p:clrMapOvr>
     <a:masterClrMapping/>
   </p:clrMapOvr>
-  <mc:AlternateContent xmlns:mc="http://schemas.openxmlformats.org/markup-compatibility/2006">
-    <mc:Choice xmlns:p14="http://schemas.microsoft.com/office/powerpoint/2010/main" Requires="p14">
+  <mc:AlternateContent xmlns:mc="http://schemas.openxmlformats.org/markup-compatibility/2006" xmlns:p14="http://schemas.microsoft.com/office/powerpoint/2010/main">
+    <mc:Choice Requires="p14">
       <p:transition spd="med">
         <p14:reveal/>
       </p:transition>
     </mc:Choice>
-    <mc:Fallback>
+    <mc:Fallback xmlns="">
       <p:transition spd="med">
         <p:fade/>
       </p:transition>
@@ -3262,13 +3262,13 @@
     <p:sldLayoutId id="2147483658" r:id="rId10"/>
     <p:sldLayoutId id="2147483659" r:id="rId11"/>
   </p:sldLayoutIdLst>
-  <mc:AlternateContent xmlns:mc="http://schemas.openxmlformats.org/markup-compatibility/2006">
-    <mc:Choice xmlns:p14="http://schemas.microsoft.com/office/powerpoint/2010/main" Requires="p14">
+  <mc:AlternateContent xmlns:mc="http://schemas.openxmlformats.org/markup-compatibility/2006" xmlns:p14="http://schemas.microsoft.com/office/powerpoint/2010/main">
+    <mc:Choice Requires="p14">
       <p:transition spd="med">
         <p14:reveal/>
       </p:transition>
     </mc:Choice>
-    <mc:Fallback>
+    <mc:Fallback xmlns="">
       <p:transition spd="med">
         <p:fade/>
       </p:transition>
@@ -3883,13 +3883,13 @@
   <p:clrMapOvr>
     <a:masterClrMapping/>
   </p:clrMapOvr>
-  <mc:AlternateContent xmlns:mc="http://schemas.openxmlformats.org/markup-compatibility/2006">
-    <mc:Choice xmlns:p14="http://schemas.microsoft.com/office/powerpoint/2010/main" Requires="p14">
+  <mc:AlternateContent xmlns:mc="http://schemas.openxmlformats.org/markup-compatibility/2006" xmlns:p14="http://schemas.microsoft.com/office/powerpoint/2010/main">
+    <mc:Choice Requires="p14">
       <p:transition spd="med">
         <p14:reveal/>
       </p:transition>
     </mc:Choice>
-    <mc:Fallback>
+    <mc:Fallback xmlns="">
       <p:transition spd="med">
         <p:fade/>
       </p:transition>
@@ -4027,13 +4027,13 @@
   <p:clrMapOvr>
     <a:masterClrMapping/>
   </p:clrMapOvr>
-  <mc:AlternateContent xmlns:mc="http://schemas.openxmlformats.org/markup-compatibility/2006">
-    <mc:Choice xmlns:p14="http://schemas.microsoft.com/office/powerpoint/2010/main" Requires="p14">
+  <mc:AlternateContent xmlns:mc="http://schemas.openxmlformats.org/markup-compatibility/2006" xmlns:p14="http://schemas.microsoft.com/office/powerpoint/2010/main">
+    <mc:Choice Requires="p14">
       <p:transition spd="med">
         <p14:reveal/>
       </p:transition>
     </mc:Choice>
-    <mc:Fallback>
+    <mc:Fallback xmlns="">
       <p:transition spd="med">
         <p:fade/>
       </p:transition>
@@ -4223,6 +4223,37 @@
         <p:spPr>
           <a:xfrm rot="5399996" flipH="1">
             <a:off x="1216239" y="2405845"/>
+            <a:ext cx="310713" cy="115406"/>
+          </a:xfrm>
+          <a:prstGeom prst="bentConnector3">
+            <a:avLst/>
+          </a:prstGeom>
+          <a:noFill/>
+          <a:ln w="6345" cap="flat">
+            <a:solidFill>
+              <a:srgbClr val="4472C4"/>
+            </a:solidFill>
+            <a:prstDash val="solid"/>
+            <a:miter/>
+            <a:tailEnd type="arrow"/>
+          </a:ln>
+        </p:spPr>
+      </p:cxnSp>
+      <p:cxnSp>
+        <p:nvCxnSpPr>
+          <p:cNvPr id="5" name="Conector: Angulado 4">
+            <a:extLst>
+              <a:ext uri="{FF2B5EF4-FFF2-40B4-BE49-F238E27FC236}">
+                <a16:creationId xmlns:a16="http://schemas.microsoft.com/office/drawing/2014/main" id="{E6EB0DF1-C99C-4A97-BF8A-DC4FF3CC6EC6}"/>
+              </a:ext>
+            </a:extLst>
+          </p:cNvPr>
+          <p:cNvCxnSpPr/>
+          <p:nvPr/>
+        </p:nvCxnSpPr>
+        <p:spPr>
+          <a:xfrm rot="5399996" flipH="1">
+            <a:off x="1216238" y="4697763"/>
             <a:ext cx="310713" cy="115406"/>
           </a:xfrm>
           <a:prstGeom prst="bentConnector3">
@@ -4249,13 +4280,13 @@
   <p:clrMapOvr>
     <a:masterClrMapping/>
   </p:clrMapOvr>
-  <mc:AlternateContent xmlns:mc="http://schemas.openxmlformats.org/markup-compatibility/2006">
-    <mc:Choice xmlns:p14="http://schemas.microsoft.com/office/powerpoint/2010/main" Requires="p14">
+  <mc:AlternateContent xmlns:mc="http://schemas.openxmlformats.org/markup-compatibility/2006" xmlns:p14="http://schemas.microsoft.com/office/powerpoint/2010/main">
+    <mc:Choice Requires="p14">
       <p:transition spd="med">
         <p14:reveal/>
       </p:transition>
     </mc:Choice>
-    <mc:Fallback>
+    <mc:Fallback xmlns="">
       <p:transition spd="med">
         <p:fade/>
       </p:transition>
@@ -4448,6 +4479,37 @@
         <p:spPr>
           <a:xfrm rot="5399996" flipH="1">
             <a:off x="1216239" y="2405845"/>
+            <a:ext cx="310713" cy="115406"/>
+          </a:xfrm>
+          <a:prstGeom prst="bentConnector3">
+            <a:avLst/>
+          </a:prstGeom>
+          <a:noFill/>
+          <a:ln w="6345" cap="flat">
+            <a:solidFill>
+              <a:srgbClr val="4472C4"/>
+            </a:solidFill>
+            <a:prstDash val="solid"/>
+            <a:miter/>
+            <a:tailEnd type="arrow"/>
+          </a:ln>
+        </p:spPr>
+      </p:cxnSp>
+      <p:cxnSp>
+        <p:nvCxnSpPr>
+          <p:cNvPr id="5" name="Conector: Angulado 4">
+            <a:extLst>
+              <a:ext uri="{FF2B5EF4-FFF2-40B4-BE49-F238E27FC236}">
+                <a16:creationId xmlns:a16="http://schemas.microsoft.com/office/drawing/2014/main" id="{E21669D7-2D30-4EF5-8F33-37EAA7B84048}"/>
+              </a:ext>
+            </a:extLst>
+          </p:cNvPr>
+          <p:cNvCxnSpPr/>
+          <p:nvPr/>
+        </p:nvCxnSpPr>
+        <p:spPr>
+          <a:xfrm rot="5399996" flipH="1">
+            <a:off x="1216239" y="4706642"/>
             <a:ext cx="310713" cy="115406"/>
           </a:xfrm>
           <a:prstGeom prst="bentConnector3">
@@ -4474,13 +4536,13 @@
   <p:clrMapOvr>
     <a:masterClrMapping/>
   </p:clrMapOvr>
-  <mc:AlternateContent xmlns:mc="http://schemas.openxmlformats.org/markup-compatibility/2006">
-    <mc:Choice xmlns:p14="http://schemas.microsoft.com/office/powerpoint/2010/main" Requires="p14">
+  <mc:AlternateContent xmlns:mc="http://schemas.openxmlformats.org/markup-compatibility/2006" xmlns:p14="http://schemas.microsoft.com/office/powerpoint/2010/main">
+    <mc:Choice Requires="p14">
       <p:transition spd="med">
         <p14:reveal/>
       </p:transition>
     </mc:Choice>
-    <mc:Fallback>
+    <mc:Fallback xmlns="">
       <p:transition spd="med">
         <p:fade/>
       </p:transition>
@@ -4674,13 +4736,13 @@
   <p:clrMapOvr>
     <a:masterClrMapping/>
   </p:clrMapOvr>
-  <mc:AlternateContent xmlns:mc="http://schemas.openxmlformats.org/markup-compatibility/2006">
-    <mc:Choice xmlns:p14="http://schemas.microsoft.com/office/powerpoint/2010/main" Requires="p14">
+  <mc:AlternateContent xmlns:mc="http://schemas.openxmlformats.org/markup-compatibility/2006" xmlns:p14="http://schemas.microsoft.com/office/powerpoint/2010/main">
+    <mc:Choice Requires="p14">
       <p:transition spd="med">
         <p14:reveal/>
       </p:transition>
     </mc:Choice>
-    <mc:Fallback>
+    <mc:Fallback xmlns="">
       <p:transition spd="med">
         <p:fade/>
       </p:transition>
@@ -4774,13 +4836,13 @@
   <p:clrMapOvr>
     <a:masterClrMapping/>
   </p:clrMapOvr>
-  <mc:AlternateContent xmlns:mc="http://schemas.openxmlformats.org/markup-compatibility/2006">
-    <mc:Choice xmlns:p14="http://schemas.microsoft.com/office/powerpoint/2010/main" Requires="p14">
+  <mc:AlternateContent xmlns:mc="http://schemas.openxmlformats.org/markup-compatibility/2006" xmlns:p14="http://schemas.microsoft.com/office/powerpoint/2010/main">
+    <mc:Choice Requires="p14">
       <p:transition spd="med">
         <p14:reveal/>
       </p:transition>
     </mc:Choice>
-    <mc:Fallback>
+    <mc:Fallback xmlns="">
       <p:transition spd="med">
         <p:fade/>
       </p:transition>

</xml_diff>